<commit_message>
SQL Saturday 696 - Redmond, WA Minor edits to slides
</commit_message>
<xml_diff>
--- a/docs/SQLSat696/Advanced SQL Server troubleshooting with SQLCallStackResolver.pptx
+++ b/docs/SQLSat696/Advanced SQL Server troubleshooting with SQLCallStackResolver.pptx
@@ -7,6 +7,9 @@
   <p:notesMasterIdLst>
     <p:notesMasterId r:id="rId32"/>
   </p:notesMasterIdLst>
+  <p:handoutMasterIdLst>
+    <p:handoutMasterId r:id="rId33"/>
+  </p:handoutMasterIdLst>
   <p:sldIdLst>
     <p:sldId id="256" r:id="rId2"/>
     <p:sldId id="257" r:id="rId3"/>
@@ -40,7 +43,7 @@
     <p:sldId id="292" r:id="rId31"/>
   </p:sldIdLst>
   <p:sldSz cx="12192000" cy="6858000"/>
-  <p:notesSz cx="6858000" cy="9144000"/>
+  <p:notesSz cx="7010400" cy="9296400"/>
   <p:defaultTextStyle>
     <a:defPPr>
       <a:defRPr lang="en-US"/>
@@ -144,6 +147,195 @@
 </p:presentation>
 </file>
 
+<file path=ppt/handoutMasters/handoutMaster1.xml><?xml version="1.0" encoding="utf-8"?>
+<p:handoutMaster xmlns:a="http://schemas.openxmlformats.org/drawingml/2006/main" xmlns:r="http://schemas.openxmlformats.org/officeDocument/2006/relationships" xmlns:p="http://schemas.openxmlformats.org/presentationml/2006/main">
+  <p:cSld>
+    <p:bg>
+      <p:bgRef idx="1001">
+        <a:schemeClr val="bg1"/>
+      </p:bgRef>
+    </p:bg>
+    <p:spTree>
+      <p:nvGrpSpPr>
+        <p:cNvPr id="1" name=""/>
+        <p:cNvGrpSpPr/>
+        <p:nvPr/>
+      </p:nvGrpSpPr>
+      <p:grpSpPr>
+        <a:xfrm>
+          <a:off x="0" y="0"/>
+          <a:ext cx="0" cy="0"/>
+          <a:chOff x="0" y="0"/>
+          <a:chExt cx="0" cy="0"/>
+        </a:xfrm>
+      </p:grpSpPr>
+      <p:sp>
+        <p:nvSpPr>
+          <p:cNvPr id="2" name="Header Placeholder 1">
+            <a:extLst>
+              <a:ext uri="{FF2B5EF4-FFF2-40B4-BE49-F238E27FC236}">
+                <a16:creationId xmlns:a16="http://schemas.microsoft.com/office/drawing/2014/main" id="{D1825F51-2EAB-4124-8BFE-1E7037EDBC93}"/>
+              </a:ext>
+            </a:extLst>
+          </p:cNvPr>
+          <p:cNvSpPr>
+            <a:spLocks noGrp="1"/>
+          </p:cNvSpPr>
+          <p:nvPr>
+            <p:ph type="hdr" sz="quarter"/>
+          </p:nvPr>
+        </p:nvSpPr>
+        <p:spPr>
+          <a:xfrm>
+            <a:off x="0" y="0"/>
+            <a:ext cx="3037840" cy="466434"/>
+          </a:xfrm>
+          <a:prstGeom prst="rect">
+            <a:avLst/>
+          </a:prstGeom>
+        </p:spPr>
+        <p:txBody>
+          <a:bodyPr vert="horz" lIns="93177" tIns="46589" rIns="93177" bIns="46589" rtlCol="0"/>
+          <a:lstStyle>
+            <a:lvl1pPr algn="l">
+              <a:defRPr sz="1200"/>
+            </a:lvl1pPr>
+          </a:lstStyle>
+          <a:p>
+            <a:endParaRPr lang="en-US"/>
+          </a:p>
+        </p:txBody>
+      </p:sp>
+      <p:sp>
+        <p:nvSpPr>
+          <p:cNvPr id="3" name="Date Placeholder 2">
+            <a:extLst>
+              <a:ext uri="{FF2B5EF4-FFF2-40B4-BE49-F238E27FC236}">
+                <a16:creationId xmlns:a16="http://schemas.microsoft.com/office/drawing/2014/main" id="{0AF38BA4-9F37-474A-8D84-22BF2F937F84}"/>
+              </a:ext>
+            </a:extLst>
+          </p:cNvPr>
+          <p:cNvSpPr>
+            <a:spLocks noGrp="1"/>
+          </p:cNvSpPr>
+          <p:nvPr>
+            <p:ph type="dt" sz="quarter" idx="1"/>
+          </p:nvPr>
+        </p:nvSpPr>
+        <p:spPr>
+          <a:xfrm>
+            <a:off x="3970938" y="0"/>
+            <a:ext cx="3037840" cy="466434"/>
+          </a:xfrm>
+          <a:prstGeom prst="rect">
+            <a:avLst/>
+          </a:prstGeom>
+        </p:spPr>
+        <p:txBody>
+          <a:bodyPr vert="horz" lIns="93177" tIns="46589" rIns="93177" bIns="46589" rtlCol="0"/>
+          <a:lstStyle>
+            <a:lvl1pPr algn="r">
+              <a:defRPr sz="1200"/>
+            </a:lvl1pPr>
+          </a:lstStyle>
+          <a:p>
+            <a:fld id="{AFBDD5B5-6030-408E-ACF8-5824645A52B3}" type="datetimeFigureOut">
+              <a:rPr lang="en-US" smtClean="0"/>
+              <a:t>2/9/2018</a:t>
+            </a:fld>
+            <a:endParaRPr lang="en-US"/>
+          </a:p>
+        </p:txBody>
+      </p:sp>
+      <p:sp>
+        <p:nvSpPr>
+          <p:cNvPr id="4" name="Footer Placeholder 3">
+            <a:extLst>
+              <a:ext uri="{FF2B5EF4-FFF2-40B4-BE49-F238E27FC236}">
+                <a16:creationId xmlns:a16="http://schemas.microsoft.com/office/drawing/2014/main" id="{EC853DF9-B65A-400E-B279-58D8E287F1F7}"/>
+              </a:ext>
+            </a:extLst>
+          </p:cNvPr>
+          <p:cNvSpPr>
+            <a:spLocks noGrp="1"/>
+          </p:cNvSpPr>
+          <p:nvPr>
+            <p:ph type="ftr" sz="quarter" idx="2"/>
+          </p:nvPr>
+        </p:nvSpPr>
+        <p:spPr>
+          <a:xfrm>
+            <a:off x="0" y="8829967"/>
+            <a:ext cx="3037840" cy="466433"/>
+          </a:xfrm>
+          <a:prstGeom prst="rect">
+            <a:avLst/>
+          </a:prstGeom>
+        </p:spPr>
+        <p:txBody>
+          <a:bodyPr vert="horz" lIns="93177" tIns="46589" rIns="93177" bIns="46589" rtlCol="0" anchor="b"/>
+          <a:lstStyle>
+            <a:lvl1pPr algn="l">
+              <a:defRPr sz="1200"/>
+            </a:lvl1pPr>
+          </a:lstStyle>
+          <a:p>
+            <a:endParaRPr lang="en-US"/>
+          </a:p>
+        </p:txBody>
+      </p:sp>
+      <p:sp>
+        <p:nvSpPr>
+          <p:cNvPr id="5" name="Slide Number Placeholder 4">
+            <a:extLst>
+              <a:ext uri="{FF2B5EF4-FFF2-40B4-BE49-F238E27FC236}">
+                <a16:creationId xmlns:a16="http://schemas.microsoft.com/office/drawing/2014/main" id="{0CBFA693-D4A8-4C2E-AD5A-E275032C4AFF}"/>
+              </a:ext>
+            </a:extLst>
+          </p:cNvPr>
+          <p:cNvSpPr>
+            <a:spLocks noGrp="1"/>
+          </p:cNvSpPr>
+          <p:nvPr>
+            <p:ph type="sldNum" sz="quarter" idx="3"/>
+          </p:nvPr>
+        </p:nvSpPr>
+        <p:spPr>
+          <a:xfrm>
+            <a:off x="3970938" y="8829967"/>
+            <a:ext cx="3037840" cy="466433"/>
+          </a:xfrm>
+          <a:prstGeom prst="rect">
+            <a:avLst/>
+          </a:prstGeom>
+        </p:spPr>
+        <p:txBody>
+          <a:bodyPr vert="horz" lIns="93177" tIns="46589" rIns="93177" bIns="46589" rtlCol="0" anchor="b"/>
+          <a:lstStyle>
+            <a:lvl1pPr algn="r">
+              <a:defRPr sz="1200"/>
+            </a:lvl1pPr>
+          </a:lstStyle>
+          <a:p>
+            <a:fld id="{392B9599-A23E-4CFD-986D-0A904F4654F7}" type="slidenum">
+              <a:rPr lang="en-US" smtClean="0"/>
+              <a:t>‹#›</a:t>
+            </a:fld>
+            <a:endParaRPr lang="en-US"/>
+          </a:p>
+        </p:txBody>
+      </p:sp>
+    </p:spTree>
+    <p:extLst>
+      <p:ext uri="{BB962C8B-B14F-4D97-AF65-F5344CB8AC3E}">
+        <p14:creationId xmlns:p14="http://schemas.microsoft.com/office/powerpoint/2010/main" val="4076923180"/>
+      </p:ext>
+    </p:extLst>
+  </p:cSld>
+  <p:clrMap bg1="lt1" tx1="dk1" bg2="lt2" tx2="dk2" accent1="accent1" accent2="accent2" accent3="accent3" accent4="accent4" accent5="accent5" accent6="accent6" hlink="hlink" folHlink="folHlink"/>
+</p:handoutMaster>
+</file>
+
 <file path=ppt/notesMasters/notesMaster1.xml><?xml version="1.0" encoding="utf-8"?>
 <p:notesMaster xmlns:a="http://schemas.openxmlformats.org/drawingml/2006/main" xmlns:r="http://schemas.openxmlformats.org/officeDocument/2006/relationships" xmlns:p="http://schemas.openxmlformats.org/presentationml/2006/main">
   <p:cSld>
@@ -179,14 +371,14 @@
         <p:spPr>
           <a:xfrm>
             <a:off x="0" y="0"/>
-            <a:ext cx="2971800" cy="458788"/>
+            <a:ext cx="3037840" cy="466434"/>
           </a:xfrm>
           <a:prstGeom prst="rect">
             <a:avLst/>
           </a:prstGeom>
         </p:spPr>
         <p:txBody>
-          <a:bodyPr vert="horz" lIns="91440" tIns="45720" rIns="91440" bIns="45720" rtlCol="0"/>
+          <a:bodyPr vert="horz" lIns="93177" tIns="46589" rIns="93177" bIns="46589" rtlCol="0"/>
           <a:lstStyle>
             <a:lvl1pPr algn="l">
               <a:defRPr sz="1200"/>
@@ -209,15 +401,15 @@
         </p:nvSpPr>
         <p:spPr>
           <a:xfrm>
-            <a:off x="3884613" y="0"/>
-            <a:ext cx="2971800" cy="458788"/>
+            <a:off x="3970938" y="0"/>
+            <a:ext cx="3037840" cy="466434"/>
           </a:xfrm>
           <a:prstGeom prst="rect">
             <a:avLst/>
           </a:prstGeom>
         </p:spPr>
         <p:txBody>
-          <a:bodyPr vert="horz" lIns="91440" tIns="45720" rIns="91440" bIns="45720" rtlCol="0"/>
+          <a:bodyPr vert="horz" lIns="93177" tIns="46589" rIns="93177" bIns="46589" rtlCol="0"/>
           <a:lstStyle>
             <a:lvl1pPr algn="r">
               <a:defRPr sz="1200"/>
@@ -244,8 +436,8 @@
         </p:nvSpPr>
         <p:spPr>
           <a:xfrm>
-            <a:off x="685800" y="1143000"/>
-            <a:ext cx="5486400" cy="3086100"/>
+            <a:off x="717550" y="1162050"/>
+            <a:ext cx="5575300" cy="3136900"/>
           </a:xfrm>
           <a:prstGeom prst="rect">
             <a:avLst/>
@@ -258,7 +450,7 @@
           </a:ln>
         </p:spPr>
         <p:txBody>
-          <a:bodyPr vert="horz" lIns="91440" tIns="45720" rIns="91440" bIns="45720" rtlCol="0" anchor="ctr"/>
+          <a:bodyPr vert="horz" lIns="93177" tIns="46589" rIns="93177" bIns="46589" rtlCol="0" anchor="ctr"/>
           <a:lstStyle/>
           <a:p>
             <a:endParaRPr lang="en-US"/>
@@ -277,15 +469,15 @@
         </p:nvSpPr>
         <p:spPr>
           <a:xfrm>
-            <a:off x="685800" y="4400550"/>
-            <a:ext cx="5486400" cy="3600450"/>
+            <a:off x="701040" y="4473892"/>
+            <a:ext cx="5608320" cy="3660458"/>
           </a:xfrm>
           <a:prstGeom prst="rect">
             <a:avLst/>
           </a:prstGeom>
         </p:spPr>
         <p:txBody>
-          <a:bodyPr vert="horz" lIns="91440" tIns="45720" rIns="91440" bIns="45720" rtlCol="0"/>
+          <a:bodyPr vert="horz" lIns="93177" tIns="46589" rIns="93177" bIns="46589" rtlCol="0"/>
           <a:lstStyle/>
           <a:p>
             <a:pPr lvl="0"/>
@@ -336,15 +528,15 @@
         </p:nvSpPr>
         <p:spPr>
           <a:xfrm>
-            <a:off x="0" y="8685213"/>
-            <a:ext cx="2971800" cy="458787"/>
+            <a:off x="0" y="8829967"/>
+            <a:ext cx="3037840" cy="466433"/>
           </a:xfrm>
           <a:prstGeom prst="rect">
             <a:avLst/>
           </a:prstGeom>
         </p:spPr>
         <p:txBody>
-          <a:bodyPr vert="horz" lIns="91440" tIns="45720" rIns="91440" bIns="45720" rtlCol="0" anchor="b"/>
+          <a:bodyPr vert="horz" lIns="93177" tIns="46589" rIns="93177" bIns="46589" rtlCol="0" anchor="b"/>
           <a:lstStyle>
             <a:lvl1pPr algn="l">
               <a:defRPr sz="1200"/>
@@ -367,15 +559,15 @@
         </p:nvSpPr>
         <p:spPr>
           <a:xfrm>
-            <a:off x="3884613" y="8685213"/>
-            <a:ext cx="2971800" cy="458787"/>
+            <a:off x="3970938" y="8829967"/>
+            <a:ext cx="3037840" cy="466433"/>
           </a:xfrm>
           <a:prstGeom prst="rect">
             <a:avLst/>
           </a:prstGeom>
         </p:spPr>
         <p:txBody>
-          <a:bodyPr vert="horz" lIns="91440" tIns="45720" rIns="91440" bIns="45720" rtlCol="0" anchor="b"/>
+          <a:bodyPr vert="horz" lIns="93177" tIns="46589" rIns="93177" bIns="46589" rtlCol="0" anchor="b"/>
           <a:lstStyle>
             <a:lvl1pPr algn="r">
               <a:defRPr sz="1200"/>
@@ -538,42 +730,17 @@
           <a:lstStyle/>
           <a:p>
             <a:r>
-              <a:rPr lang="en-US" sz="1200" b="0" i="0" u="none" strike="noStrike" kern="1200" dirty="0">
-                <a:solidFill>
-                  <a:schemeClr val="tx1"/>
-                </a:solidFill>
-                <a:effectLst/>
-                <a:latin typeface="+mn-lt"/>
-                <a:ea typeface="+mn-ea"/>
-                <a:cs typeface="+mn-cs"/>
-              </a:rPr>
+              <a:rPr lang="en-US" dirty="0"/>
               <a:t>Troubleshooting spinlock contention, strange wait types, AVs and asserts is no longer a black box. With the availability of SQLCallStackResolver (http://aka.ms/sqlstack) you can start uncovering the true reasons for a particular behavior within SQL Server, without having to open </a:t>
             </a:r>
             <a:r>
-              <a:rPr lang="en-US" sz="1200" b="0" i="0" u="none" strike="noStrike" kern="1200" dirty="0" err="1">
-                <a:solidFill>
-                  <a:schemeClr val="tx1"/>
-                </a:solidFill>
-                <a:effectLst/>
-                <a:latin typeface="+mn-lt"/>
-                <a:ea typeface="+mn-ea"/>
-                <a:cs typeface="+mn-cs"/>
-              </a:rPr>
+              <a:rPr lang="en-US" dirty="0" err="1"/>
               <a:t>WinDbg</a:t>
             </a:r>
             <a:r>
-              <a:rPr lang="en-US" sz="1200" b="0" i="0" u="none" strike="noStrike" kern="1200" dirty="0">
-                <a:solidFill>
-                  <a:schemeClr val="tx1"/>
-                </a:solidFill>
-                <a:effectLst/>
-                <a:latin typeface="+mn-lt"/>
-                <a:ea typeface="+mn-ea"/>
-                <a:cs typeface="+mn-cs"/>
-              </a:rPr>
+              <a:rPr lang="en-US" dirty="0"/>
               <a:t>! This tool can potentially save you a call to Microsoft Support (or at least go much better prepared to them!) In this session you will be presented live demos of how SQLCallStackResolver has helped in real-life cases, both for SQL Server on Windows and SQL Server on Linux. Latch contention, spinlock contention, AVs are no longer a mystery with this tool. Come and see how you can tackle the most difficult and advanced SQL Server troubleshooting scenarios yourself!</a:t>
             </a:r>
-            <a:endParaRPr lang="en-US" dirty="0"/>
           </a:p>
         </p:txBody>
       </p:sp>
@@ -993,21 +1160,7 @@
           <a:bodyPr/>
           <a:lstStyle/>
           <a:p>
-            <a:pPr marL="0" marR="0" lvl="0" indent="0" algn="l" defTabSz="914400" rtl="0" eaLnBrk="1" fontAlgn="auto" latinLnBrk="0" hangingPunct="1">
-              <a:lnSpc>
-                <a:spcPct val="100000"/>
-              </a:lnSpc>
-              <a:spcBef>
-                <a:spcPts val="0"/>
-              </a:spcBef>
-              <a:spcAft>
-                <a:spcPts val="0"/>
-              </a:spcAft>
-              <a:buClrTx/>
-              <a:buSzTx/>
-              <a:buFontTx/>
-              <a:buNone/>
-              <a:tabLst/>
+            <a:pPr defTabSz="931774">
               <a:defRPr/>
             </a:pPr>
             <a:r>
@@ -1053,65 +1206,29 @@
           </a:p>
           <a:p>
             <a:r>
-              <a:rPr lang="en-US" sz="1200" kern="1200" dirty="0">
-                <a:solidFill>
-                  <a:schemeClr val="tx1"/>
-                </a:solidFill>
-                <a:latin typeface="+mn-lt"/>
-                <a:ea typeface="+mn-ea"/>
-                <a:cs typeface="+mn-cs"/>
-              </a:rPr>
+              <a:rPr lang="en-US" dirty="0"/>
               <a:t>SELECT * </a:t>
             </a:r>
           </a:p>
           <a:p>
             <a:r>
-              <a:rPr lang="sv-SE" sz="1200" kern="1200" dirty="0">
-                <a:solidFill>
-                  <a:schemeClr val="tx1"/>
-                </a:solidFill>
-                <a:latin typeface="+mn-lt"/>
-                <a:ea typeface="+mn-ea"/>
-                <a:cs typeface="+mn-cs"/>
-              </a:rPr>
+              <a:rPr lang="sv-SE" dirty="0"/>
               <a:t>FROM sys.dm_os_spinlock_stats</a:t>
             </a:r>
           </a:p>
           <a:p>
             <a:r>
-              <a:rPr lang="en-US" sz="1200" kern="1200" dirty="0">
-                <a:solidFill>
-                  <a:schemeClr val="tx1"/>
-                </a:solidFill>
-                <a:latin typeface="+mn-lt"/>
-                <a:ea typeface="+mn-ea"/>
-                <a:cs typeface="+mn-cs"/>
-              </a:rPr>
+              <a:rPr lang="en-US" dirty="0"/>
               <a:t>ORDER BY </a:t>
             </a:r>
             <a:r>
-              <a:rPr lang="en-US" sz="1200" kern="1200" dirty="0" err="1">
-                <a:solidFill>
-                  <a:schemeClr val="tx1"/>
-                </a:solidFill>
-                <a:latin typeface="+mn-lt"/>
-                <a:ea typeface="+mn-ea"/>
-                <a:cs typeface="+mn-cs"/>
-              </a:rPr>
+              <a:rPr lang="en-US" dirty="0" err="1"/>
               <a:t>backoffs</a:t>
             </a:r>
             <a:r>
-              <a:rPr lang="en-US" sz="1200" kern="1200" dirty="0">
-                <a:solidFill>
-                  <a:schemeClr val="tx1"/>
-                </a:solidFill>
-                <a:latin typeface="+mn-lt"/>
-                <a:ea typeface="+mn-ea"/>
-                <a:cs typeface="+mn-cs"/>
-              </a:rPr>
+              <a:rPr lang="en-US" dirty="0"/>
               <a:t> DESC</a:t>
             </a:r>
-            <a:endParaRPr lang="en-US" dirty="0"/>
           </a:p>
           <a:p>
             <a:endParaRPr lang="en-US" dirty="0"/>
@@ -1198,21 +1315,7 @@
           <a:bodyPr/>
           <a:lstStyle/>
           <a:p>
-            <a:pPr marL="0" marR="0" lvl="0" indent="0" algn="l" defTabSz="914400" rtl="0" eaLnBrk="1" fontAlgn="auto" latinLnBrk="0" hangingPunct="1">
-              <a:lnSpc>
-                <a:spcPct val="100000"/>
-              </a:lnSpc>
-              <a:spcBef>
-                <a:spcPts val="0"/>
-              </a:spcBef>
-              <a:spcAft>
-                <a:spcPts val="0"/>
-              </a:spcAft>
-              <a:buClrTx/>
-              <a:buSzTx/>
-              <a:buFontTx/>
-              <a:buNone/>
-              <a:tabLst/>
+            <a:pPr defTabSz="931774">
               <a:defRPr/>
             </a:pPr>
             <a:r>
@@ -1225,21 +1328,7 @@
             </a:r>
           </a:p>
           <a:p>
-            <a:pPr marL="0" marR="0" lvl="0" indent="0" algn="l" defTabSz="914400" rtl="0" eaLnBrk="1" fontAlgn="auto" latinLnBrk="0" hangingPunct="1">
-              <a:lnSpc>
-                <a:spcPct val="100000"/>
-              </a:lnSpc>
-              <a:spcBef>
-                <a:spcPts val="0"/>
-              </a:spcBef>
-              <a:spcAft>
-                <a:spcPts val="0"/>
-              </a:spcAft>
-              <a:buClrTx/>
-              <a:buSzTx/>
-              <a:buFontTx/>
-              <a:buNone/>
-              <a:tabLst/>
+            <a:pPr defTabSz="931774">
               <a:defRPr/>
             </a:pPr>
             <a:r>
@@ -1338,21 +1427,7 @@
           <a:bodyPr/>
           <a:lstStyle/>
           <a:p>
-            <a:pPr marL="0" marR="0" lvl="0" indent="0" algn="l" defTabSz="914400" rtl="0" eaLnBrk="1" fontAlgn="auto" latinLnBrk="0" hangingPunct="1">
-              <a:lnSpc>
-                <a:spcPct val="100000"/>
-              </a:lnSpc>
-              <a:spcBef>
-                <a:spcPts val="0"/>
-              </a:spcBef>
-              <a:spcAft>
-                <a:spcPts val="0"/>
-              </a:spcAft>
-              <a:buClrTx/>
-              <a:buSzTx/>
-              <a:buFontTx/>
-              <a:buNone/>
-              <a:tabLst/>
+            <a:pPr defTabSz="931774">
               <a:defRPr/>
             </a:pPr>
             <a:r>
@@ -1455,21 +1530,7 @@
           <a:bodyPr/>
           <a:lstStyle/>
           <a:p>
-            <a:pPr marL="0" marR="0" lvl="0" indent="0" algn="l" defTabSz="914400" rtl="0" eaLnBrk="1" fontAlgn="auto" latinLnBrk="0" hangingPunct="1">
-              <a:lnSpc>
-                <a:spcPct val="100000"/>
-              </a:lnSpc>
-              <a:spcBef>
-                <a:spcPts val="0"/>
-              </a:spcBef>
-              <a:spcAft>
-                <a:spcPts val="0"/>
-              </a:spcAft>
-              <a:buClrTx/>
-              <a:buSzTx/>
-              <a:buFontTx/>
-              <a:buNone/>
-              <a:tabLst/>
+            <a:pPr defTabSz="931774">
               <a:defRPr/>
             </a:pPr>
             <a:r>
@@ -1656,21 +1717,7 @@
           <a:bodyPr/>
           <a:lstStyle/>
           <a:p>
-            <a:pPr marL="0" marR="0" lvl="0" indent="0" algn="l" defTabSz="914400" rtl="0" eaLnBrk="1" fontAlgn="auto" latinLnBrk="0" hangingPunct="1">
-              <a:lnSpc>
-                <a:spcPct val="100000"/>
-              </a:lnSpc>
-              <a:spcBef>
-                <a:spcPts val="0"/>
-              </a:spcBef>
-              <a:spcAft>
-                <a:spcPts val="0"/>
-              </a:spcAft>
-              <a:buClrTx/>
-              <a:buSzTx/>
-              <a:buFontTx/>
-              <a:buNone/>
-              <a:tabLst/>
+            <a:pPr defTabSz="931774">
               <a:defRPr/>
             </a:pPr>
             <a:r>
@@ -2025,21 +2072,7 @@
           <a:bodyPr/>
           <a:lstStyle/>
           <a:p>
-            <a:pPr marL="0" marR="0" lvl="0" indent="0" algn="l" defTabSz="914400" rtl="0" eaLnBrk="1" fontAlgn="auto" latinLnBrk="0" hangingPunct="1">
-              <a:lnSpc>
-                <a:spcPct val="100000"/>
-              </a:lnSpc>
-              <a:spcBef>
-                <a:spcPts val="0"/>
-              </a:spcBef>
-              <a:spcAft>
-                <a:spcPts val="0"/>
-              </a:spcAft>
-              <a:buClrTx/>
-              <a:buSzTx/>
-              <a:buFontTx/>
-              <a:buNone/>
-              <a:tabLst/>
+            <a:pPr defTabSz="931774">
               <a:defRPr/>
             </a:pPr>
             <a:r>
@@ -7370,7 +7403,7 @@
         </p:spPr>
         <p:txBody>
           <a:bodyPr>
-            <a:normAutofit/>
+            <a:normAutofit fontScale="92500" lnSpcReduction="20000"/>
           </a:bodyPr>
           <a:lstStyle/>
           <a:p>
@@ -7379,33 +7412,36 @@
           <a:p>
             <a:r>
               <a:rPr lang="en-US" dirty="0"/>
-              <a:t>Arvind Shyamsundar (</a:t>
+              <a:t>Arvind Shyamsundar</a:t>
+            </a:r>
+          </a:p>
+          <a:p>
+            <a:r>
+              <a:rPr lang="en-US" dirty="0"/>
+              <a:t>Principal Program Manager | Microsoft Azure CAT (a.k.a. SQLCAT)</a:t>
+            </a:r>
+          </a:p>
+          <a:p>
+            <a:r>
+              <a:rPr lang="en-US" dirty="0"/>
+              <a:t>Twitter: @</a:t>
+            </a:r>
+            <a:r>
+              <a:rPr lang="en-US" dirty="0" err="1"/>
+              <a:t>arvisam</a:t>
+            </a:r>
+            <a:endParaRPr lang="en-US" dirty="0"/>
+          </a:p>
+          <a:p>
+            <a:r>
+              <a:rPr lang="en-US" dirty="0"/>
+              <a:t>Blog: </a:t>
             </a:r>
             <a:r>
               <a:rPr lang="en-US" dirty="0">
                 <a:hlinkClick r:id="rId3"/>
               </a:rPr>
-              <a:t>arvindsh@microsoft.com</a:t>
-            </a:r>
-            <a:r>
-              <a:rPr lang="en-US" dirty="0"/>
-              <a:t>)</a:t>
-            </a:r>
-          </a:p>
-          <a:p>
-            <a:r>
-              <a:rPr lang="en-US" dirty="0"/>
-              <a:t>Principal Program Manager | Microsoft Azure CAT (a.k.a. SQLCAT)</a:t>
-            </a:r>
-          </a:p>
-          <a:p>
-            <a:r>
-              <a:rPr lang="en-US" dirty="0"/>
-              <a:t>Twitter: @</a:t>
-            </a:r>
-            <a:r>
-              <a:rPr lang="en-US" dirty="0" err="1"/>
-              <a:t>arvisam</a:t>
+              <a:t>http://aka.ms/arvindsh</a:t>
             </a:r>
             <a:endParaRPr lang="en-US" dirty="0"/>
           </a:p>
@@ -24195,4 +24231,299 @@
     </a:ext>
   </a:extLst>
 </a:theme>
+</file>
+
+<file path=ppt/theme/theme3.xml><?xml version="1.0" encoding="utf-8"?>
+<a:theme xmlns:a="http://schemas.openxmlformats.org/drawingml/2006/main" name="Office Theme">
+  <a:themeElements>
+    <a:clrScheme name="Office">
+      <a:dk1>
+        <a:sysClr val="windowText" lastClr="000000"/>
+      </a:dk1>
+      <a:lt1>
+        <a:sysClr val="window" lastClr="FFFFFF"/>
+      </a:lt1>
+      <a:dk2>
+        <a:srgbClr val="44546A"/>
+      </a:dk2>
+      <a:lt2>
+        <a:srgbClr val="E7E6E6"/>
+      </a:lt2>
+      <a:accent1>
+        <a:srgbClr val="4472C4"/>
+      </a:accent1>
+      <a:accent2>
+        <a:srgbClr val="ED7D31"/>
+      </a:accent2>
+      <a:accent3>
+        <a:srgbClr val="A5A5A5"/>
+      </a:accent3>
+      <a:accent4>
+        <a:srgbClr val="FFC000"/>
+      </a:accent4>
+      <a:accent5>
+        <a:srgbClr val="5B9BD5"/>
+      </a:accent5>
+      <a:accent6>
+        <a:srgbClr val="70AD47"/>
+      </a:accent6>
+      <a:hlink>
+        <a:srgbClr val="0563C1"/>
+      </a:hlink>
+      <a:folHlink>
+        <a:srgbClr val="954F72"/>
+      </a:folHlink>
+    </a:clrScheme>
+    <a:fontScheme name="Office">
+      <a:majorFont>
+        <a:latin typeface="Calibri Light" panose="020F0302020204030204"/>
+        <a:ea typeface=""/>
+        <a:cs typeface=""/>
+        <a:font script="Jpan" typeface="游ゴシック Light"/>
+        <a:font script="Hang" typeface="맑은 고딕"/>
+        <a:font script="Hans" typeface="等线 Light"/>
+        <a:font script="Hant" typeface="新細明體"/>
+        <a:font script="Arab" typeface="Times New Roman"/>
+        <a:font script="Hebr" typeface="Times New Roman"/>
+        <a:font script="Thai" typeface="Angsana New"/>
+        <a:font script="Ethi" typeface="Nyala"/>
+        <a:font script="Beng" typeface="Vrinda"/>
+        <a:font script="Gujr" typeface="Shruti"/>
+        <a:font script="Khmr" typeface="MoolBoran"/>
+        <a:font script="Knda" typeface="Tunga"/>
+        <a:font script="Guru" typeface="Raavi"/>
+        <a:font script="Cans" typeface="Euphemia"/>
+        <a:font script="Cher" typeface="Plantagenet Cherokee"/>
+        <a:font script="Yiii" typeface="Microsoft Yi Baiti"/>
+        <a:font script="Tibt" typeface="Microsoft Himalaya"/>
+        <a:font script="Thaa" typeface="MV Boli"/>
+        <a:font script="Deva" typeface="Mangal"/>
+        <a:font script="Telu" typeface="Gautami"/>
+        <a:font script="Taml" typeface="Latha"/>
+        <a:font script="Syrc" typeface="Estrangelo Edessa"/>
+        <a:font script="Orya" typeface="Kalinga"/>
+        <a:font script="Mlym" typeface="Kartika"/>
+        <a:font script="Laoo" typeface="DokChampa"/>
+        <a:font script="Sinh" typeface="Iskoola Pota"/>
+        <a:font script="Mong" typeface="Mongolian Baiti"/>
+        <a:font script="Viet" typeface="Times New Roman"/>
+        <a:font script="Uigh" typeface="Microsoft Uighur"/>
+        <a:font script="Geor" typeface="Sylfaen"/>
+        <a:font script="Armn" typeface="Arial"/>
+        <a:font script="Bugi" typeface="Leelawadee UI"/>
+        <a:font script="Bopo" typeface="Microsoft JhengHei"/>
+        <a:font script="Java" typeface="Javanese Text"/>
+        <a:font script="Lisu" typeface="Segoe UI"/>
+        <a:font script="Mymr" typeface="Myanmar Text"/>
+        <a:font script="Nkoo" typeface="Ebrima"/>
+        <a:font script="Olck" typeface="Nirmala UI"/>
+        <a:font script="Osma" typeface="Ebrima"/>
+        <a:font script="Phag" typeface="Phagspa"/>
+        <a:font script="Syrn" typeface="Estrangelo Edessa"/>
+        <a:font script="Syrj" typeface="Estrangelo Edessa"/>
+        <a:font script="Syre" typeface="Estrangelo Edessa"/>
+        <a:font script="Sora" typeface="Nirmala UI"/>
+        <a:font script="Tale" typeface="Microsoft Tai Le"/>
+        <a:font script="Talu" typeface="Microsoft New Tai Lue"/>
+        <a:font script="Tfng" typeface="Ebrima"/>
+      </a:majorFont>
+      <a:minorFont>
+        <a:latin typeface="Calibri" panose="020F0502020204030204"/>
+        <a:ea typeface=""/>
+        <a:cs typeface=""/>
+        <a:font script="Jpan" typeface="游ゴシック"/>
+        <a:font script="Hang" typeface="맑은 고딕"/>
+        <a:font script="Hans" typeface="等线"/>
+        <a:font script="Hant" typeface="新細明體"/>
+        <a:font script="Arab" typeface="Arial"/>
+        <a:font script="Hebr" typeface="Arial"/>
+        <a:font script="Thai" typeface="Cordia New"/>
+        <a:font script="Ethi" typeface="Nyala"/>
+        <a:font script="Beng" typeface="Vrinda"/>
+        <a:font script="Gujr" typeface="Shruti"/>
+        <a:font script="Khmr" typeface="DaunPenh"/>
+        <a:font script="Knda" typeface="Tunga"/>
+        <a:font script="Guru" typeface="Raavi"/>
+        <a:font script="Cans" typeface="Euphemia"/>
+        <a:font script="Cher" typeface="Plantagenet Cherokee"/>
+        <a:font script="Yiii" typeface="Microsoft Yi Baiti"/>
+        <a:font script="Tibt" typeface="Microsoft Himalaya"/>
+        <a:font script="Thaa" typeface="MV Boli"/>
+        <a:font script="Deva" typeface="Mangal"/>
+        <a:font script="Telu" typeface="Gautami"/>
+        <a:font script="Taml" typeface="Latha"/>
+        <a:font script="Syrc" typeface="Estrangelo Edessa"/>
+        <a:font script="Orya" typeface="Kalinga"/>
+        <a:font script="Mlym" typeface="Kartika"/>
+        <a:font script="Laoo" typeface="DokChampa"/>
+        <a:font script="Sinh" typeface="Iskoola Pota"/>
+        <a:font script="Mong" typeface="Mongolian Baiti"/>
+        <a:font script="Viet" typeface="Arial"/>
+        <a:font script="Uigh" typeface="Microsoft Uighur"/>
+        <a:font script="Geor" typeface="Sylfaen"/>
+        <a:font script="Armn" typeface="Arial"/>
+        <a:font script="Bugi" typeface="Leelawadee UI"/>
+        <a:font script="Bopo" typeface="Microsoft JhengHei"/>
+        <a:font script="Java" typeface="Javanese Text"/>
+        <a:font script="Lisu" typeface="Segoe UI"/>
+        <a:font script="Mymr" typeface="Myanmar Text"/>
+        <a:font script="Nkoo" typeface="Ebrima"/>
+        <a:font script="Olck" typeface="Nirmala UI"/>
+        <a:font script="Osma" typeface="Ebrima"/>
+        <a:font script="Phag" typeface="Phagspa"/>
+        <a:font script="Syrn" typeface="Estrangelo Edessa"/>
+        <a:font script="Syrj" typeface="Estrangelo Edessa"/>
+        <a:font script="Syre" typeface="Estrangelo Edessa"/>
+        <a:font script="Sora" typeface="Nirmala UI"/>
+        <a:font script="Tale" typeface="Microsoft Tai Le"/>
+        <a:font script="Talu" typeface="Microsoft New Tai Lue"/>
+        <a:font script="Tfng" typeface="Ebrima"/>
+      </a:minorFont>
+    </a:fontScheme>
+    <a:fmtScheme name="Office">
+      <a:fillStyleLst>
+        <a:solidFill>
+          <a:schemeClr val="phClr"/>
+        </a:solidFill>
+        <a:gradFill rotWithShape="1">
+          <a:gsLst>
+            <a:gs pos="0">
+              <a:schemeClr val="phClr">
+                <a:lumMod val="110000"/>
+                <a:satMod val="105000"/>
+                <a:tint val="67000"/>
+              </a:schemeClr>
+            </a:gs>
+            <a:gs pos="50000">
+              <a:schemeClr val="phClr">
+                <a:lumMod val="105000"/>
+                <a:satMod val="103000"/>
+                <a:tint val="73000"/>
+              </a:schemeClr>
+            </a:gs>
+            <a:gs pos="100000">
+              <a:schemeClr val="phClr">
+                <a:lumMod val="105000"/>
+                <a:satMod val="109000"/>
+                <a:tint val="81000"/>
+              </a:schemeClr>
+            </a:gs>
+          </a:gsLst>
+          <a:lin ang="5400000" scaled="0"/>
+        </a:gradFill>
+        <a:gradFill rotWithShape="1">
+          <a:gsLst>
+            <a:gs pos="0">
+              <a:schemeClr val="phClr">
+                <a:satMod val="103000"/>
+                <a:lumMod val="102000"/>
+                <a:tint val="94000"/>
+              </a:schemeClr>
+            </a:gs>
+            <a:gs pos="50000">
+              <a:schemeClr val="phClr">
+                <a:satMod val="110000"/>
+                <a:lumMod val="100000"/>
+                <a:shade val="100000"/>
+              </a:schemeClr>
+            </a:gs>
+            <a:gs pos="100000">
+              <a:schemeClr val="phClr">
+                <a:lumMod val="99000"/>
+                <a:satMod val="120000"/>
+                <a:shade val="78000"/>
+              </a:schemeClr>
+            </a:gs>
+          </a:gsLst>
+          <a:lin ang="5400000" scaled="0"/>
+        </a:gradFill>
+      </a:fillStyleLst>
+      <a:lnStyleLst>
+        <a:ln w="6350" cap="flat" cmpd="sng" algn="ctr">
+          <a:solidFill>
+            <a:schemeClr val="phClr"/>
+          </a:solidFill>
+          <a:prstDash val="solid"/>
+          <a:miter lim="800000"/>
+        </a:ln>
+        <a:ln w="12700" cap="flat" cmpd="sng" algn="ctr">
+          <a:solidFill>
+            <a:schemeClr val="phClr"/>
+          </a:solidFill>
+          <a:prstDash val="solid"/>
+          <a:miter lim="800000"/>
+        </a:ln>
+        <a:ln w="19050" cap="flat" cmpd="sng" algn="ctr">
+          <a:solidFill>
+            <a:schemeClr val="phClr"/>
+          </a:solidFill>
+          <a:prstDash val="solid"/>
+          <a:miter lim="800000"/>
+        </a:ln>
+      </a:lnStyleLst>
+      <a:effectStyleLst>
+        <a:effectStyle>
+          <a:effectLst/>
+        </a:effectStyle>
+        <a:effectStyle>
+          <a:effectLst/>
+        </a:effectStyle>
+        <a:effectStyle>
+          <a:effectLst>
+            <a:outerShdw blurRad="57150" dist="19050" dir="5400000" algn="ctr" rotWithShape="0">
+              <a:srgbClr val="000000">
+                <a:alpha val="63000"/>
+              </a:srgbClr>
+            </a:outerShdw>
+          </a:effectLst>
+        </a:effectStyle>
+      </a:effectStyleLst>
+      <a:bgFillStyleLst>
+        <a:solidFill>
+          <a:schemeClr val="phClr"/>
+        </a:solidFill>
+        <a:solidFill>
+          <a:schemeClr val="phClr">
+            <a:tint val="95000"/>
+            <a:satMod val="170000"/>
+          </a:schemeClr>
+        </a:solidFill>
+        <a:gradFill rotWithShape="1">
+          <a:gsLst>
+            <a:gs pos="0">
+              <a:schemeClr val="phClr">
+                <a:tint val="93000"/>
+                <a:satMod val="150000"/>
+                <a:shade val="98000"/>
+                <a:lumMod val="102000"/>
+              </a:schemeClr>
+            </a:gs>
+            <a:gs pos="50000">
+              <a:schemeClr val="phClr">
+                <a:tint val="98000"/>
+                <a:satMod val="130000"/>
+                <a:shade val="90000"/>
+                <a:lumMod val="103000"/>
+              </a:schemeClr>
+            </a:gs>
+            <a:gs pos="100000">
+              <a:schemeClr val="phClr">
+                <a:shade val="63000"/>
+                <a:satMod val="120000"/>
+              </a:schemeClr>
+            </a:gs>
+          </a:gsLst>
+          <a:lin ang="5400000" scaled="0"/>
+        </a:gradFill>
+      </a:bgFillStyleLst>
+    </a:fmtScheme>
+  </a:themeElements>
+  <a:objectDefaults/>
+  <a:extraClrSchemeLst/>
+  <a:extLst>
+    <a:ext uri="{05A4C25C-085E-4340-85A3-A5531E510DB2}">
+      <thm15:themeFamily xmlns:thm15="http://schemas.microsoft.com/office/thememl/2012/main" name="Office Theme" id="{62F939B6-93AF-4DB8-9C6B-D6C7DFDC589F}" vid="{4A3C46E8-61CC-4603-A589-7422A47A8E4A}"/>
+    </a:ext>
+  </a:extLst>
+</a:theme>
 </file>
</xml_diff>

<commit_message>
SQL Saturday 696 - Redmond Minor edits to slides
</commit_message>
<xml_diff>
--- a/docs/SQLSat696/Advanced SQL Server troubleshooting with SQLCallStackResolver.pptx
+++ b/docs/SQLSat696/Advanced SQL Server troubleshooting with SQLCallStackResolver.pptx
@@ -241,7 +241,7 @@
           <a:p>
             <a:fld id="{AFBDD5B5-6030-408E-ACF8-5824645A52B3}" type="datetimeFigureOut">
               <a:rPr lang="en-US" smtClean="0"/>
-              <a:t>2/9/2018</a:t>
+              <a:t>2/10/2018</a:t>
             </a:fld>
             <a:endParaRPr lang="en-US"/>
           </a:p>
@@ -418,7 +418,7 @@
           <a:p>
             <a:fld id="{1F5661C2-4B46-45B0-A323-F278B3D6835D}" type="datetimeFigureOut">
               <a:rPr lang="en-US" smtClean="0"/>
-              <a:t>2/9/2018</a:t>
+              <a:t>2/10/2018</a:t>
             </a:fld>
             <a:endParaRPr lang="en-US"/>
           </a:p>
@@ -3797,7 +3797,7 @@
           <a:p>
             <a:fld id="{7BC5BF34-4B0C-45CB-A100-304D3C94F56B}" type="datetimeFigureOut">
               <a:rPr lang="en-US" smtClean="0"/>
-              <a:t>2/9/2018</a:t>
+              <a:t>2/10/2018</a:t>
             </a:fld>
             <a:endParaRPr lang="en-US"/>
           </a:p>
@@ -3981,7 +3981,7 @@
           <a:p>
             <a:fld id="{7BC5BF34-4B0C-45CB-A100-304D3C94F56B}" type="datetimeFigureOut">
               <a:rPr lang="en-US" smtClean="0"/>
-              <a:t>2/9/2018</a:t>
+              <a:t>2/10/2018</a:t>
             </a:fld>
             <a:endParaRPr lang="en-US"/>
           </a:p>
@@ -4161,7 +4161,7 @@
           <a:p>
             <a:fld id="{7BC5BF34-4B0C-45CB-A100-304D3C94F56B}" type="datetimeFigureOut">
               <a:rPr lang="en-US" smtClean="0"/>
-              <a:t>2/9/2018</a:t>
+              <a:t>2/10/2018</a:t>
             </a:fld>
             <a:endParaRPr lang="en-US"/>
           </a:p>
@@ -4336,7 +4336,7 @@
           <a:p>
             <a:fld id="{7BC5BF34-4B0C-45CB-A100-304D3C94F56B}" type="datetimeFigureOut">
               <a:rPr lang="en-US" smtClean="0"/>
-              <a:t>2/9/2018</a:t>
+              <a:t>2/10/2018</a:t>
             </a:fld>
             <a:endParaRPr lang="en-US"/>
           </a:p>
@@ -4649,7 +4649,7 @@
           <a:p>
             <a:fld id="{7BC5BF34-4B0C-45CB-A100-304D3C94F56B}" type="datetimeFigureOut">
               <a:rPr lang="en-US" smtClean="0"/>
-              <a:t>2/9/2018</a:t>
+              <a:t>2/10/2018</a:t>
             </a:fld>
             <a:endParaRPr lang="en-US"/>
           </a:p>
@@ -5040,7 +5040,7 @@
           <a:p>
             <a:fld id="{7BC5BF34-4B0C-45CB-A100-304D3C94F56B}" type="datetimeFigureOut">
               <a:rPr lang="en-US" smtClean="0"/>
-              <a:t>2/9/2018</a:t>
+              <a:t>2/10/2018</a:t>
             </a:fld>
             <a:endParaRPr lang="en-US"/>
           </a:p>
@@ -5479,7 +5479,7 @@
           <a:p>
             <a:fld id="{7BC5BF34-4B0C-45CB-A100-304D3C94F56B}" type="datetimeFigureOut">
               <a:rPr lang="en-US" smtClean="0"/>
-              <a:t>2/9/2018</a:t>
+              <a:t>2/10/2018</a:t>
             </a:fld>
             <a:endParaRPr lang="en-US"/>
           </a:p>
@@ -5602,7 +5602,7 @@
           <a:p>
             <a:fld id="{7BC5BF34-4B0C-45CB-A100-304D3C94F56B}" type="datetimeFigureOut">
               <a:rPr lang="en-US" smtClean="0"/>
-              <a:t>2/9/2018</a:t>
+              <a:t>2/10/2018</a:t>
             </a:fld>
             <a:endParaRPr lang="en-US"/>
           </a:p>
@@ -5697,7 +5697,7 @@
           <a:p>
             <a:fld id="{7BC5BF34-4B0C-45CB-A100-304D3C94F56B}" type="datetimeFigureOut">
               <a:rPr lang="en-US" smtClean="0"/>
-              <a:t>2/9/2018</a:t>
+              <a:t>2/10/2018</a:t>
             </a:fld>
             <a:endParaRPr lang="en-US"/>
           </a:p>
@@ -6052,7 +6052,7 @@
           <a:p>
             <a:fld id="{7BC5BF34-4B0C-45CB-A100-304D3C94F56B}" type="datetimeFigureOut">
               <a:rPr lang="en-US" smtClean="0"/>
-              <a:t>2/9/2018</a:t>
+              <a:t>2/10/2018</a:t>
             </a:fld>
             <a:endParaRPr lang="en-US"/>
           </a:p>
@@ -6482,7 +6482,7 @@
           <a:p>
             <a:fld id="{7BC5BF34-4B0C-45CB-A100-304D3C94F56B}" type="datetimeFigureOut">
               <a:rPr lang="en-US" smtClean="0"/>
-              <a:t>2/9/2018</a:t>
+              <a:t>2/10/2018</a:t>
             </a:fld>
             <a:endParaRPr lang="en-US"/>
           </a:p>
@@ -6763,7 +6763,7 @@
           <a:p>
             <a:fld id="{7BC5BF34-4B0C-45CB-A100-304D3C94F56B}" type="datetimeFigureOut">
               <a:rPr lang="en-US" smtClean="0"/>
-              <a:t>2/9/2018</a:t>
+              <a:t>2/10/2018</a:t>
             </a:fld>
             <a:endParaRPr lang="en-US"/>
           </a:p>
@@ -11454,7 +11454,7 @@
           <a:p>
             <a:r>
               <a:rPr lang="en-US" dirty="0"/>
-              <a:t>Let’s LOOK AT…</a:t>
+              <a:t>AGENDA</a:t>
             </a:r>
           </a:p>
         </p:txBody>
@@ -11488,85 +11488,76 @@
           <a:lstStyle/>
           <a:p>
             <a:r>
-              <a:rPr lang="en-US" dirty="0"/>
+              <a:rPr lang="en-US" sz="2400" dirty="0"/>
               <a:t>Target SQL scenarios</a:t>
             </a:r>
           </a:p>
           <a:p>
             <a:r>
-              <a:rPr lang="en-US" dirty="0"/>
-              <a:t>Debugging basics</a:t>
+              <a:rPr lang="en-US" sz="2400" dirty="0"/>
+              <a:t>Basics</a:t>
             </a:r>
           </a:p>
           <a:p>
             <a:pPr lvl="1"/>
             <a:r>
-              <a:rPr lang="en-US" dirty="0"/>
-              <a:t>A lap inside the SQLServer.exe process</a:t>
+              <a:rPr lang="en-US" sz="2000" dirty="0"/>
+              <a:t>Different ways that you can collect call stacks</a:t>
             </a:r>
           </a:p>
           <a:p>
             <a:pPr lvl="1"/>
             <a:r>
-              <a:rPr lang="en-US" dirty="0"/>
-              <a:t>Call stacks and PDB symbols</a:t>
-            </a:r>
-          </a:p>
-          <a:p>
-            <a:r>
-              <a:rPr lang="en-US" dirty="0"/>
+              <a:rPr lang="en-US" sz="2000" dirty="0"/>
+              <a:t>Why PDB symbols are important</a:t>
+            </a:r>
+          </a:p>
+          <a:p>
+            <a:r>
+              <a:rPr lang="en-US" sz="2400" dirty="0"/>
               <a:t>SQLCallStackResolver basics</a:t>
             </a:r>
           </a:p>
           <a:p>
             <a:pPr lvl="1"/>
             <a:r>
-              <a:rPr lang="en-US" dirty="0"/>
+              <a:rPr lang="en-US" sz="2000" dirty="0"/>
               <a:t>Installation and UI</a:t>
             </a:r>
           </a:p>
           <a:p>
             <a:pPr lvl="1"/>
             <a:r>
-              <a:rPr lang="en-US" dirty="0"/>
-              <a:t>Matching PDB symbols</a:t>
-            </a:r>
-          </a:p>
-          <a:p>
-            <a:r>
-              <a:rPr lang="en-US" dirty="0"/>
-              <a:t>Resolving various avatars of call stacks</a:t>
+              <a:rPr lang="en-US" sz="2000" dirty="0"/>
+              <a:t>Getting PDB symbols for specific SQL builds</a:t>
             </a:r>
           </a:p>
           <a:p>
             <a:pPr lvl="1"/>
             <a:r>
-              <a:rPr lang="en-US" dirty="0"/>
-              <a:t>Module + offset format</a:t>
+              <a:rPr lang="en-US" sz="2000" dirty="0"/>
+              <a:t>Working with XEL files</a:t>
+            </a:r>
+          </a:p>
+          <a:p>
+            <a:r>
+              <a:rPr lang="en-US" sz="2400" dirty="0"/>
+              <a:t>Case Studies</a:t>
             </a:r>
           </a:p>
           <a:p>
             <a:pPr lvl="1"/>
             <a:r>
-              <a:rPr lang="en-US" dirty="0"/>
-              <a:t>Hex address only</a:t>
+              <a:rPr lang="en-US" sz="2000" dirty="0"/>
+              <a:t>LOCK_HASH spinlock contention</a:t>
             </a:r>
           </a:p>
           <a:p>
             <a:pPr lvl="1"/>
             <a:r>
-              <a:rPr lang="en-US" dirty="0"/>
-              <a:t>XEL files</a:t>
-            </a:r>
-          </a:p>
-          <a:p>
-            <a:r>
-              <a:rPr lang="en-US" dirty="0"/>
-              <a:t>Recap / Wrap-up</a:t>
-            </a:r>
-          </a:p>
-          <a:p>
-            <a:endParaRPr lang="en-US" dirty="0"/>
+              <a:rPr lang="en-US" sz="2000" dirty="0"/>
+              <a:t>Diagnosing PAGELATCH_EX wait</a:t>
+            </a:r>
           </a:p>
         </p:txBody>
       </p:sp>

</xml_diff>